<commit_message>
Found a mistake in the architecture diagram, updating.
</commit_message>
<xml_diff>
--- a/public/resources/architecture.pptx
+++ b/public/resources/architecture.pptx
@@ -288,7 +288,7 @@
           <a:p>
             <a:fld id="{42B91F73-6AE0-4745-B45E-FE44108DBBA9}" type="datetimeFigureOut">
               <a:rPr lang="en-CA" smtClean="0"/>
-              <a:t>14/06/2014</a:t>
+              <a:t>18/06/2014</a:t>
             </a:fld>
             <a:endParaRPr lang="en-CA"/>
           </a:p>
@@ -458,7 +458,7 @@
           <a:p>
             <a:fld id="{42B91F73-6AE0-4745-B45E-FE44108DBBA9}" type="datetimeFigureOut">
               <a:rPr lang="en-CA" smtClean="0"/>
-              <a:t>14/06/2014</a:t>
+              <a:t>18/06/2014</a:t>
             </a:fld>
             <a:endParaRPr lang="en-CA"/>
           </a:p>
@@ -638,7 +638,7 @@
           <a:p>
             <a:fld id="{42B91F73-6AE0-4745-B45E-FE44108DBBA9}" type="datetimeFigureOut">
               <a:rPr lang="en-CA" smtClean="0"/>
-              <a:t>14/06/2014</a:t>
+              <a:t>18/06/2014</a:t>
             </a:fld>
             <a:endParaRPr lang="en-CA"/>
           </a:p>
@@ -808,7 +808,7 @@
           <a:p>
             <a:fld id="{42B91F73-6AE0-4745-B45E-FE44108DBBA9}" type="datetimeFigureOut">
               <a:rPr lang="en-CA" smtClean="0"/>
-              <a:t>14/06/2014</a:t>
+              <a:t>18/06/2014</a:t>
             </a:fld>
             <a:endParaRPr lang="en-CA"/>
           </a:p>
@@ -1054,7 +1054,7 @@
           <a:p>
             <a:fld id="{42B91F73-6AE0-4745-B45E-FE44108DBBA9}" type="datetimeFigureOut">
               <a:rPr lang="en-CA" smtClean="0"/>
-              <a:t>14/06/2014</a:t>
+              <a:t>18/06/2014</a:t>
             </a:fld>
             <a:endParaRPr lang="en-CA"/>
           </a:p>
@@ -1342,7 +1342,7 @@
           <a:p>
             <a:fld id="{42B91F73-6AE0-4745-B45E-FE44108DBBA9}" type="datetimeFigureOut">
               <a:rPr lang="en-CA" smtClean="0"/>
-              <a:t>14/06/2014</a:t>
+              <a:t>18/06/2014</a:t>
             </a:fld>
             <a:endParaRPr lang="en-CA"/>
           </a:p>
@@ -1764,7 +1764,7 @@
           <a:p>
             <a:fld id="{42B91F73-6AE0-4745-B45E-FE44108DBBA9}" type="datetimeFigureOut">
               <a:rPr lang="en-CA" smtClean="0"/>
-              <a:t>14/06/2014</a:t>
+              <a:t>18/06/2014</a:t>
             </a:fld>
             <a:endParaRPr lang="en-CA"/>
           </a:p>
@@ -1882,7 +1882,7 @@
           <a:p>
             <a:fld id="{42B91F73-6AE0-4745-B45E-FE44108DBBA9}" type="datetimeFigureOut">
               <a:rPr lang="en-CA" smtClean="0"/>
-              <a:t>14/06/2014</a:t>
+              <a:t>18/06/2014</a:t>
             </a:fld>
             <a:endParaRPr lang="en-CA"/>
           </a:p>
@@ -1977,7 +1977,7 @@
           <a:p>
             <a:fld id="{42B91F73-6AE0-4745-B45E-FE44108DBBA9}" type="datetimeFigureOut">
               <a:rPr lang="en-CA" smtClean="0"/>
-              <a:t>14/06/2014</a:t>
+              <a:t>18/06/2014</a:t>
             </a:fld>
             <a:endParaRPr lang="en-CA"/>
           </a:p>
@@ -2254,7 +2254,7 @@
           <a:p>
             <a:fld id="{42B91F73-6AE0-4745-B45E-FE44108DBBA9}" type="datetimeFigureOut">
               <a:rPr lang="en-CA" smtClean="0"/>
-              <a:t>14/06/2014</a:t>
+              <a:t>18/06/2014</a:t>
             </a:fld>
             <a:endParaRPr lang="en-CA"/>
           </a:p>
@@ -2507,7 +2507,7 @@
           <a:p>
             <a:fld id="{42B91F73-6AE0-4745-B45E-FE44108DBBA9}" type="datetimeFigureOut">
               <a:rPr lang="en-CA" smtClean="0"/>
-              <a:t>14/06/2014</a:t>
+              <a:t>18/06/2014</a:t>
             </a:fld>
             <a:endParaRPr lang="en-CA"/>
           </a:p>
@@ -2720,7 +2720,7 @@
           <a:p>
             <a:fld id="{42B91F73-6AE0-4745-B45E-FE44108DBBA9}" type="datetimeFigureOut">
               <a:rPr lang="en-CA" smtClean="0"/>
-              <a:t>14/06/2014</a:t>
+              <a:t>18/06/2014</a:t>
             </a:fld>
             <a:endParaRPr lang="en-CA"/>
           </a:p>
@@ -3180,8 +3180,8 @@
           <a:p>
             <a:pPr algn="ctr"/>
             <a:r>
-              <a:rPr lang="en-CA" dirty="0" err="1" smtClean="0"/>
-              <a:t>Routes.config</a:t>
+              <a:rPr lang="en-CA" smtClean="0"/>
+              <a:t>Routes</a:t>
             </a:r>
             <a:endParaRPr lang="en-CA" dirty="0"/>
           </a:p>

</xml_diff>